<commit_message>
update NF Requirements slide
</commit_message>
<xml_diff>
--- a/Slides/Lesson 1.2 Requirements Gathering.pptx
+++ b/Slides/Lesson 1.2 Requirements Gathering.pptx
@@ -3665,7 +3665,7 @@
           <a:p>
             <a:fld id="{7C7E5181-6CF5-45F7-A87A-E0E0B1FD7549}" type="datetimeFigureOut">
               <a:rPr lang="en-US" smtClean="0"/>
-              <a:t>8/31/2022</a:t>
+              <a:t>9/5/2022</a:t>
             </a:fld>
             <a:endParaRPr lang="en-US"/>
           </a:p>
@@ -4636,7 +4636,168 @@
             </a:pPr>
             <a:r>
               <a:rPr lang="en-US" dirty="0"/>
-              <a:t>“Can I retrieve my files, and if so, how long will it take?” is probably another use case</a:t>
+              <a:t>There are a number of important NF requirements to discuss. Here are some</a:t>
+            </a:r>
+          </a:p>
+          <a:p>
+            <a:pPr marL="0" marR="0" lvl="0" indent="0" algn="l" defTabSz="914400" rtl="0" eaLnBrk="1" fontAlgn="auto" latinLnBrk="0" hangingPunct="1">
+              <a:lnSpc>
+                <a:spcPct val="100000"/>
+              </a:lnSpc>
+              <a:spcBef>
+                <a:spcPts val="0"/>
+              </a:spcBef>
+              <a:spcAft>
+                <a:spcPts val="0"/>
+              </a:spcAft>
+              <a:buClrTx/>
+              <a:buSzTx/>
+              <a:buFontTx/>
+              <a:buNone/>
+              <a:tabLst/>
+              <a:defRPr/>
+            </a:pPr>
+            <a:r>
+              <a:rPr lang="en-US" dirty="0"/>
+              <a:t>Security — Does your product store or transmit sensitive information? Does your IT department require adherence to specific standards? What security best practices are used in your industry?</a:t>
+            </a:r>
+          </a:p>
+          <a:p>
+            <a:pPr marL="0" marR="0" lvl="0" indent="0" algn="l" defTabSz="914400" rtl="0" eaLnBrk="1" fontAlgn="auto" latinLnBrk="0" hangingPunct="1">
+              <a:lnSpc>
+                <a:spcPct val="100000"/>
+              </a:lnSpc>
+              <a:spcBef>
+                <a:spcPts val="0"/>
+              </a:spcBef>
+              <a:spcAft>
+                <a:spcPts val="0"/>
+              </a:spcAft>
+              <a:buClrTx/>
+              <a:buSzTx/>
+              <a:buFontTx/>
+              <a:buNone/>
+              <a:tabLst/>
+              <a:defRPr/>
+            </a:pPr>
+            <a:r>
+              <a:rPr lang="en-US" dirty="0"/>
+              <a:t>Capacity — What are your system’s storage requirements, today and in the future? How will your system scale up for increasing volume demands?</a:t>
+            </a:r>
+          </a:p>
+          <a:p>
+            <a:pPr marL="0" marR="0" lvl="0" indent="0" algn="l" defTabSz="914400" rtl="0" eaLnBrk="1" fontAlgn="auto" latinLnBrk="0" hangingPunct="1">
+              <a:lnSpc>
+                <a:spcPct val="100000"/>
+              </a:lnSpc>
+              <a:spcBef>
+                <a:spcPts val="0"/>
+              </a:spcBef>
+              <a:spcAft>
+                <a:spcPts val="0"/>
+              </a:spcAft>
+              <a:buClrTx/>
+              <a:buSzTx/>
+              <a:buFontTx/>
+              <a:buNone/>
+              <a:tabLst/>
+              <a:defRPr/>
+            </a:pPr>
+            <a:r>
+              <a:rPr lang="en-US" dirty="0"/>
+              <a:t>Compatibility — What are the minimum hardware requirements? What operating systems and their versions must be supported?</a:t>
+            </a:r>
+          </a:p>
+          <a:p>
+            <a:pPr marL="0" marR="0" lvl="0" indent="0" algn="l" defTabSz="914400" rtl="0" eaLnBrk="1" fontAlgn="auto" latinLnBrk="0" hangingPunct="1">
+              <a:lnSpc>
+                <a:spcPct val="100000"/>
+              </a:lnSpc>
+              <a:spcBef>
+                <a:spcPts val="0"/>
+              </a:spcBef>
+              <a:spcAft>
+                <a:spcPts val="0"/>
+              </a:spcAft>
+              <a:buClrTx/>
+              <a:buSzTx/>
+              <a:buFontTx/>
+              <a:buNone/>
+              <a:tabLst/>
+              <a:defRPr/>
+            </a:pPr>
+            <a:r>
+              <a:rPr lang="en-US" dirty="0"/>
+              <a:t>Reliability and Availability — What is the critical failure time under normal usage? Does a user need access to this all hours of every day?</a:t>
+            </a:r>
+          </a:p>
+          <a:p>
+            <a:pPr marL="0" marR="0" lvl="0" indent="0" algn="l" defTabSz="914400" rtl="0" eaLnBrk="1" fontAlgn="auto" latinLnBrk="0" hangingPunct="1">
+              <a:lnSpc>
+                <a:spcPct val="100000"/>
+              </a:lnSpc>
+              <a:spcBef>
+                <a:spcPts val="0"/>
+              </a:spcBef>
+              <a:spcAft>
+                <a:spcPts val="0"/>
+              </a:spcAft>
+              <a:buClrTx/>
+              <a:buSzTx/>
+              <a:buFontTx/>
+              <a:buNone/>
+              <a:tabLst/>
+              <a:defRPr/>
+            </a:pPr>
+            <a:r>
+              <a:rPr lang="en-US" dirty="0"/>
+              <a:t>Maintainability  + Manageability—How much time does it take to fix components, and how easily can an administrator manage the system? Under this umbrella, you could also define Recoverability and Serviceability.</a:t>
+            </a:r>
+          </a:p>
+          <a:p>
+            <a:pPr marL="0" marR="0" lvl="0" indent="0" algn="l" defTabSz="914400" rtl="0" eaLnBrk="1" fontAlgn="auto" latinLnBrk="0" hangingPunct="1">
+              <a:lnSpc>
+                <a:spcPct val="100000"/>
+              </a:lnSpc>
+              <a:spcBef>
+                <a:spcPts val="0"/>
+              </a:spcBef>
+              <a:spcAft>
+                <a:spcPts val="0"/>
+              </a:spcAft>
+              <a:buClrTx/>
+              <a:buSzTx/>
+              <a:buFontTx/>
+              <a:buNone/>
+              <a:tabLst/>
+              <a:defRPr/>
+            </a:pPr>
+            <a:r>
+              <a:rPr lang="en-US" dirty="0"/>
+              <a:t>Scalability – The Black Friday test. What are the highest workloads under which the system will still perform as expected?</a:t>
+            </a:r>
+          </a:p>
+          <a:p>
+            <a:pPr marL="0" marR="0" lvl="0" indent="0" algn="l" defTabSz="914400" rtl="0" eaLnBrk="1" fontAlgn="auto" latinLnBrk="0" hangingPunct="1">
+              <a:lnSpc>
+                <a:spcPct val="100000"/>
+              </a:lnSpc>
+              <a:spcBef>
+                <a:spcPts val="0"/>
+              </a:spcBef>
+              <a:spcAft>
+                <a:spcPts val="0"/>
+              </a:spcAft>
+              <a:buClrTx/>
+              <a:buSzTx/>
+              <a:buFontTx/>
+              <a:buNone/>
+              <a:tabLst/>
+              <a:defRPr/>
+            </a:pPr>
+            <a:r>
+              <a:rPr lang="en-US" dirty="0"/>
+              <a:t>Usability — How easy is it to use the product? What defines the experience of using the product?</a:t>
             </a:r>
           </a:p>
         </p:txBody>
@@ -6397,7 +6558,7 @@
           <a:p>
             <a:fld id="{5D2A64DE-480B-420F-9649-4F8E696E08E0}" type="datetime1">
               <a:rPr lang="en-US" smtClean="0"/>
-              <a:t>8/31/2022</a:t>
+              <a:t>9/5/2022</a:t>
             </a:fld>
             <a:endParaRPr lang="en-US"/>
           </a:p>
@@ -6721,7 +6882,7 @@
           <a:p>
             <a:fld id="{EA476A42-A091-4468-A075-64A31BE59948}" type="datetime1">
               <a:rPr lang="en-US" smtClean="0"/>
-              <a:t>8/31/2022</a:t>
+              <a:t>9/5/2022</a:t>
             </a:fld>
             <a:endParaRPr lang="en-US"/>
           </a:p>
@@ -6919,7 +7080,7 @@
           <a:p>
             <a:fld id="{0D3616D0-8311-4107-9726-6B805E7D05BA}" type="datetime1">
               <a:rPr lang="en-US" smtClean="0"/>
-              <a:t>8/31/2022</a:t>
+              <a:t>9/5/2022</a:t>
             </a:fld>
             <a:endParaRPr lang="en-US"/>
           </a:p>
@@ -7127,7 +7288,7 @@
           <a:p>
             <a:fld id="{3BC2557A-5C88-417A-A763-5AC779462A5F}" type="datetime1">
               <a:rPr lang="en-US" smtClean="0"/>
-              <a:t>8/31/2022</a:t>
+              <a:t>9/5/2022</a:t>
             </a:fld>
             <a:endParaRPr lang="en-US"/>
           </a:p>
@@ -7651,7 +7812,7 @@
           <a:p>
             <a:fld id="{07C7BFD4-467E-4EDE-93EA-052F5B39A4E5}" type="datetime1">
               <a:rPr lang="en-US" smtClean="0"/>
-              <a:t>8/31/2022</a:t>
+              <a:t>9/5/2022</a:t>
             </a:fld>
             <a:endParaRPr lang="en-US"/>
           </a:p>
@@ -7901,7 +8062,7 @@
           <a:p>
             <a:fld id="{07C7BFD4-467E-4EDE-93EA-052F5B39A4E5}" type="datetime1">
               <a:rPr lang="en-US" smtClean="0"/>
-              <a:t>8/31/2022</a:t>
+              <a:t>9/5/2022</a:t>
             </a:fld>
             <a:endParaRPr lang="en-US"/>
           </a:p>
@@ -8083,7 +8244,7 @@
           <a:p>
             <a:fld id="{109E55A0-C911-4F03-82FC-7E5926047D46}" type="datetime1">
               <a:rPr lang="en-US" smtClean="0"/>
-              <a:t>8/31/2022</a:t>
+              <a:t>9/5/2022</a:t>
             </a:fld>
             <a:endParaRPr lang="en-US"/>
           </a:p>
@@ -8396,7 +8557,7 @@
           <a:p>
             <a:fld id="{A533CBE2-D5BE-47AC-ADC2-9CDFC1D0CF90}" type="datetime1">
               <a:rPr lang="en-US" smtClean="0"/>
-              <a:t>8/31/2022</a:t>
+              <a:t>9/5/2022</a:t>
             </a:fld>
             <a:endParaRPr lang="en-US"/>
           </a:p>
@@ -8697,7 +8858,7 @@
           <a:p>
             <a:fld id="{39B7EDB1-CE74-4951-85A2-0B01C2128E28}" type="datetime1">
               <a:rPr lang="en-US" smtClean="0"/>
-              <a:t>8/31/2022</a:t>
+              <a:t>9/5/2022</a:t>
             </a:fld>
             <a:endParaRPr lang="en-US"/>
           </a:p>
@@ -9145,7 +9306,7 @@
           <a:p>
             <a:fld id="{2BC7EB92-A5C2-4807-A9DC-9EDE6CBFB241}" type="datetime1">
               <a:rPr lang="en-US" smtClean="0"/>
-              <a:t>8/31/2022</a:t>
+              <a:t>9/5/2022</a:t>
             </a:fld>
             <a:endParaRPr lang="en-US"/>
           </a:p>
@@ -9258,7 +9419,7 @@
           <a:p>
             <a:fld id="{2B7B7EE0-7771-4CD5-9B2B-3550753A54A1}" type="datetime1">
               <a:rPr lang="en-US" smtClean="0"/>
-              <a:t>8/31/2022</a:t>
+              <a:t>9/5/2022</a:t>
             </a:fld>
             <a:endParaRPr lang="en-US"/>
           </a:p>
@@ -9569,7 +9730,7 @@
           <a:p>
             <a:fld id="{F8B318B3-0E87-4416-A9B8-D891968C2727}" type="datetime1">
               <a:rPr lang="en-US" smtClean="0"/>
-              <a:t>8/31/2022</a:t>
+              <a:t>9/5/2022</a:t>
             </a:fld>
             <a:endParaRPr lang="en-US"/>
           </a:p>
@@ -9810,7 +9971,7 @@
           <a:p>
             <a:fld id="{54D997E8-DDEE-43F1-8D9B-F8A1E11DE488}" type="datetime1">
               <a:rPr lang="en-US" smtClean="0"/>
-              <a:t>8/31/2022</a:t>
+              <a:t>9/5/2022</a:t>
             </a:fld>
             <a:endParaRPr lang="en-US"/>
           </a:p>
@@ -12136,39 +12297,6 @@
       </p:sp>
       <p:sp>
         <p:nvSpPr>
-          <p:cNvPr id="3" name="Content Placeholder 2">
-            <a:extLst>
-              <a:ext uri="{FF2B5EF4-FFF2-40B4-BE49-F238E27FC236}">
-                <a16:creationId xmlns:a16="http://schemas.microsoft.com/office/drawing/2014/main" id="{E9F968A6-CC31-4AE6-83F3-85021744E177}"/>
-              </a:ext>
-            </a:extLst>
-          </p:cNvPr>
-          <p:cNvSpPr>
-            <a:spLocks noGrp="1"/>
-          </p:cNvSpPr>
-          <p:nvPr>
-            <p:ph idx="1"/>
-          </p:nvPr>
-        </p:nvSpPr>
-        <p:spPr>
-          <a:xfrm>
-            <a:off x="838200" y="1500160"/>
-            <a:ext cx="10515600" cy="4351338"/>
-          </a:xfrm>
-        </p:spPr>
-        <p:txBody>
-          <a:bodyPr/>
-          <a:lstStyle/>
-          <a:p>
-            <a:r>
-              <a:rPr lang="en-US" dirty="0"/>
-              <a:t>TO ADD</a:t>
-            </a:r>
-          </a:p>
-        </p:txBody>
-      </p:sp>
-      <p:sp>
-        <p:nvSpPr>
           <p:cNvPr id="4" name="Slide Number Placeholder 3">
             <a:extLst>
               <a:ext uri="{FF2B5EF4-FFF2-40B4-BE49-F238E27FC236}">
@@ -12193,6 +12321,74 @@
               <a:t>15</a:t>
             </a:fld>
             <a:endParaRPr lang="en-US"/>
+          </a:p>
+        </p:txBody>
+      </p:sp>
+      <p:sp>
+        <p:nvSpPr>
+          <p:cNvPr id="9" name="Content Placeholder 2">
+            <a:extLst>
+              <a:ext uri="{FF2B5EF4-FFF2-40B4-BE49-F238E27FC236}">
+                <a16:creationId xmlns:a16="http://schemas.microsoft.com/office/drawing/2014/main" id="{154B344C-9133-E9C8-0056-74943F854D75}"/>
+              </a:ext>
+            </a:extLst>
+          </p:cNvPr>
+          <p:cNvSpPr>
+            <a:spLocks noGrp="1"/>
+          </p:cNvSpPr>
+          <p:nvPr>
+            <p:ph idx="1"/>
+          </p:nvPr>
+        </p:nvSpPr>
+        <p:spPr>
+          <a:xfrm>
+            <a:off x="838200" y="1500188"/>
+            <a:ext cx="9521142" cy="4351337"/>
+          </a:xfrm>
+        </p:spPr>
+        <p:txBody>
+          <a:bodyPr/>
+          <a:lstStyle/>
+          <a:p>
+            <a:r>
+              <a:rPr lang="en-US" dirty="0"/>
+              <a:t>Does “After successfully retrieving a student transcript, a correct grade is updated for an existing student” guarantee success?</a:t>
+            </a:r>
+          </a:p>
+          <a:p>
+            <a:pPr lvl="1"/>
+            <a:r>
+              <a:rPr lang="en-US" dirty="0"/>
+              <a:t>How quickly can a transcript be retrieval? (Performance)</a:t>
+            </a:r>
+          </a:p>
+          <a:p>
+            <a:pPr lvl="1"/>
+            <a:r>
+              <a:rPr lang="en-US" dirty="0"/>
+              <a:t>How many student transcripts can our system store? (Scalability)</a:t>
+            </a:r>
+          </a:p>
+          <a:p>
+            <a:pPr lvl="1"/>
+            <a:r>
+              <a:rPr lang="en-US" dirty="0"/>
+              <a:t>How long did I spend on the phone with support to set up the software? (Usability)</a:t>
+            </a:r>
+          </a:p>
+          <a:p>
+            <a:pPr lvl="1"/>
+            <a:r>
+              <a:rPr lang="en-US" dirty="0"/>
+              <a:t>After my system is setup, is the access controlled at all? (Security)</a:t>
+            </a:r>
+          </a:p>
+          <a:p>
+            <a:pPr lvl="1"/>
+            <a:r>
+              <a:rPr lang="en-US" dirty="0"/>
+              <a:t>Are these any times when I can’t use this system? (Availability) </a:t>
+            </a:r>
           </a:p>
         </p:txBody>
       </p:sp>

</xml_diff>